<commit_message>
added plots to poster
</commit_message>
<xml_diff>
--- a/poster.pptx
+++ b/poster.pptx
@@ -3035,6 +3035,573 @@
           </a:p>
         </p:txBody>
       </p:sp>
+      <p:grpSp>
+        <p:nvGrpSpPr>
+          <p:cNvPr id="29" name="Group 28"/>
+          <p:cNvGrpSpPr/>
+          <p:nvPr/>
+        </p:nvGrpSpPr>
+        <p:grpSpPr>
+          <a:xfrm>
+            <a:off x="12095628" y="4269427"/>
+            <a:ext cx="12270443" cy="23822497"/>
+            <a:chOff x="12095628" y="4269427"/>
+            <a:chExt cx="12270443" cy="23822497"/>
+          </a:xfrm>
+        </p:grpSpPr>
+        <p:sp>
+          <p:nvSpPr>
+            <p:cNvPr id="20" name="TextBox 19"/>
+            <p:cNvSpPr txBox="1"/>
+            <p:nvPr/>
+          </p:nvSpPr>
+          <p:spPr>
+            <a:xfrm>
+              <a:off x="12095629" y="4269427"/>
+              <a:ext cx="12270441" cy="1049646"/>
+            </a:xfrm>
+            <a:prstGeom prst="rect">
+              <a:avLst/>
+            </a:prstGeom>
+            <a:noFill/>
+          </p:spPr>
+          <p:txBody>
+            <a:bodyPr wrap="square" rtlCol="0">
+              <a:spAutoFit/>
+            </a:bodyPr>
+            <a:lstStyle/>
+            <a:p>
+              <a:pPr algn="ctr"/>
+              <a:r>
+                <a:rPr lang="en-US" b="1" dirty="0" smtClean="0">
+                  <a:latin typeface="Agency FB" panose="020B0503020202020204" pitchFamily="34" charset="0"/>
+                </a:rPr>
+                <a:t>Bivariate Analysis by Position</a:t>
+              </a:r>
+              <a:endParaRPr lang="en-US" b="1" dirty="0">
+                <a:latin typeface="Agency FB" panose="020B0503020202020204" pitchFamily="34" charset="0"/>
+              </a:endParaRPr>
+            </a:p>
+          </p:txBody>
+        </p:sp>
+        <p:grpSp>
+          <p:nvGrpSpPr>
+            <p:cNvPr id="27" name="Group 26"/>
+            <p:cNvGrpSpPr/>
+            <p:nvPr/>
+          </p:nvGrpSpPr>
+          <p:grpSpPr>
+            <a:xfrm>
+              <a:off x="12095629" y="5835377"/>
+              <a:ext cx="12270442" cy="5930057"/>
+              <a:chOff x="12095629" y="5835377"/>
+              <a:chExt cx="12270442" cy="5930057"/>
+            </a:xfrm>
+          </p:grpSpPr>
+          <p:grpSp>
+            <p:nvGrpSpPr>
+              <p:cNvPr id="9" name="Group 8"/>
+              <p:cNvGrpSpPr/>
+              <p:nvPr/>
+            </p:nvGrpSpPr>
+            <p:grpSpPr>
+              <a:xfrm>
+                <a:off x="12095630" y="6993596"/>
+                <a:ext cx="12270441" cy="4771838"/>
+                <a:chOff x="7416053" y="11296650"/>
+                <a:chExt cx="17145000" cy="6667500"/>
+              </a:xfrm>
+            </p:grpSpPr>
+            <p:pic>
+              <p:nvPicPr>
+                <p:cNvPr id="6" name="Picture 5"/>
+                <p:cNvPicPr>
+                  <a:picLocks noChangeAspect="1"/>
+                </p:cNvPicPr>
+                <p:nvPr/>
+              </p:nvPicPr>
+              <p:blipFill>
+                <a:blip r:embed="rId2">
+                  <a:extLst>
+                    <a:ext uri="{28A0092B-C50C-407E-A947-70E740481C1C}">
+                      <a14:useLocalDpi xmlns:a14="http://schemas.microsoft.com/office/drawing/2010/main" val="0"/>
+                    </a:ext>
+                  </a:extLst>
+                </a:blip>
+                <a:stretch>
+                  <a:fillRect/>
+                </a:stretch>
+              </p:blipFill>
+              <p:spPr>
+                <a:xfrm>
+                  <a:off x="7416053" y="11296650"/>
+                  <a:ext cx="5715000" cy="6667500"/>
+                </a:xfrm>
+                <a:prstGeom prst="rect">
+                  <a:avLst/>
+                </a:prstGeom>
+              </p:spPr>
+            </p:pic>
+            <p:pic>
+              <p:nvPicPr>
+                <p:cNvPr id="7" name="Picture 6"/>
+                <p:cNvPicPr>
+                  <a:picLocks noChangeAspect="1"/>
+                </p:cNvPicPr>
+                <p:nvPr/>
+              </p:nvPicPr>
+              <p:blipFill>
+                <a:blip r:embed="rId3">
+                  <a:extLst>
+                    <a:ext uri="{28A0092B-C50C-407E-A947-70E740481C1C}">
+                      <a14:useLocalDpi xmlns:a14="http://schemas.microsoft.com/office/drawing/2010/main" val="0"/>
+                    </a:ext>
+                  </a:extLst>
+                </a:blip>
+                <a:stretch>
+                  <a:fillRect/>
+                </a:stretch>
+              </p:blipFill>
+              <p:spPr>
+                <a:xfrm>
+                  <a:off x="13131053" y="11296650"/>
+                  <a:ext cx="5715000" cy="6667500"/>
+                </a:xfrm>
+                <a:prstGeom prst="rect">
+                  <a:avLst/>
+                </a:prstGeom>
+              </p:spPr>
+            </p:pic>
+            <p:pic>
+              <p:nvPicPr>
+                <p:cNvPr id="8" name="Picture 7"/>
+                <p:cNvPicPr>
+                  <a:picLocks noChangeAspect="1"/>
+                </p:cNvPicPr>
+                <p:nvPr/>
+              </p:nvPicPr>
+              <p:blipFill>
+                <a:blip r:embed="rId4">
+                  <a:extLst>
+                    <a:ext uri="{28A0092B-C50C-407E-A947-70E740481C1C}">
+                      <a14:useLocalDpi xmlns:a14="http://schemas.microsoft.com/office/drawing/2010/main" val="0"/>
+                    </a:ext>
+                  </a:extLst>
+                </a:blip>
+                <a:stretch>
+                  <a:fillRect/>
+                </a:stretch>
+              </p:blipFill>
+              <p:spPr>
+                <a:xfrm>
+                  <a:off x="18846053" y="11296650"/>
+                  <a:ext cx="5715000" cy="6667500"/>
+                </a:xfrm>
+                <a:prstGeom prst="rect">
+                  <a:avLst/>
+                </a:prstGeom>
+              </p:spPr>
+            </p:pic>
+          </p:grpSp>
+          <p:sp>
+            <p:nvSpPr>
+              <p:cNvPr id="21" name="TextBox 20"/>
+              <p:cNvSpPr txBox="1"/>
+              <p:nvPr/>
+            </p:nvSpPr>
+            <p:spPr>
+              <a:xfrm>
+                <a:off x="12095629" y="5835377"/>
+                <a:ext cx="12270441" cy="1049646"/>
+              </a:xfrm>
+              <a:prstGeom prst="rect">
+                <a:avLst/>
+              </a:prstGeom>
+              <a:noFill/>
+            </p:spPr>
+            <p:txBody>
+              <a:bodyPr wrap="square" rtlCol="0">
+                <a:spAutoFit/>
+              </a:bodyPr>
+              <a:lstStyle/>
+              <a:p>
+                <a:pPr algn="ctr"/>
+                <a:r>
+                  <a:rPr lang="en-US" dirty="0" smtClean="0">
+                    <a:latin typeface="Agency FB" panose="020B0503020202020204" pitchFamily="34" charset="0"/>
+                  </a:rPr>
+                  <a:t>40 Yard Dash vs. Career Yardage </a:t>
+                </a:r>
+                <a:endParaRPr lang="en-US" dirty="0">
+                  <a:latin typeface="Agency FB" panose="020B0503020202020204" pitchFamily="34" charset="0"/>
+                </a:endParaRPr>
+              </a:p>
+            </p:txBody>
+          </p:sp>
+        </p:grpSp>
+        <p:grpSp>
+          <p:nvGrpSpPr>
+            <p:cNvPr id="28" name="Group 27"/>
+            <p:cNvGrpSpPr/>
+            <p:nvPr/>
+          </p:nvGrpSpPr>
+          <p:grpSpPr>
+            <a:xfrm>
+              <a:off x="12095629" y="22215164"/>
+              <a:ext cx="12270441" cy="5876760"/>
+              <a:chOff x="12095629" y="22215164"/>
+              <a:chExt cx="12270441" cy="5876760"/>
+            </a:xfrm>
+          </p:grpSpPr>
+          <p:grpSp>
+            <p:nvGrpSpPr>
+              <p:cNvPr id="17" name="Group 16"/>
+              <p:cNvGrpSpPr/>
+              <p:nvPr/>
+            </p:nvGrpSpPr>
+            <p:grpSpPr>
+              <a:xfrm>
+                <a:off x="12095629" y="23320086"/>
+                <a:ext cx="12270441" cy="4771838"/>
+                <a:chOff x="5963771" y="22782207"/>
+                <a:chExt cx="17145000" cy="6667500"/>
+              </a:xfrm>
+            </p:grpSpPr>
+            <p:pic>
+              <p:nvPicPr>
+                <p:cNvPr id="14" name="Picture 13"/>
+                <p:cNvPicPr>
+                  <a:picLocks noChangeAspect="1"/>
+                </p:cNvPicPr>
+                <p:nvPr/>
+              </p:nvPicPr>
+              <p:blipFill>
+                <a:blip r:embed="rId5">
+                  <a:extLst>
+                    <a:ext uri="{28A0092B-C50C-407E-A947-70E740481C1C}">
+                      <a14:useLocalDpi xmlns:a14="http://schemas.microsoft.com/office/drawing/2010/main" val="0"/>
+                    </a:ext>
+                  </a:extLst>
+                </a:blip>
+                <a:stretch>
+                  <a:fillRect/>
+                </a:stretch>
+              </p:blipFill>
+              <p:spPr>
+                <a:xfrm>
+                  <a:off x="5963771" y="22782207"/>
+                  <a:ext cx="5715000" cy="6667500"/>
+                </a:xfrm>
+                <a:prstGeom prst="rect">
+                  <a:avLst/>
+                </a:prstGeom>
+              </p:spPr>
+            </p:pic>
+            <p:pic>
+              <p:nvPicPr>
+                <p:cNvPr id="15" name="Picture 14"/>
+                <p:cNvPicPr>
+                  <a:picLocks noChangeAspect="1"/>
+                </p:cNvPicPr>
+                <p:nvPr/>
+              </p:nvPicPr>
+              <p:blipFill>
+                <a:blip r:embed="rId6">
+                  <a:extLst>
+                    <a:ext uri="{28A0092B-C50C-407E-A947-70E740481C1C}">
+                      <a14:useLocalDpi xmlns:a14="http://schemas.microsoft.com/office/drawing/2010/main" val="0"/>
+                    </a:ext>
+                  </a:extLst>
+                </a:blip>
+                <a:stretch>
+                  <a:fillRect/>
+                </a:stretch>
+              </p:blipFill>
+              <p:spPr>
+                <a:xfrm>
+                  <a:off x="11678771" y="22782207"/>
+                  <a:ext cx="5715000" cy="6667500"/>
+                </a:xfrm>
+                <a:prstGeom prst="rect">
+                  <a:avLst/>
+                </a:prstGeom>
+              </p:spPr>
+            </p:pic>
+            <p:pic>
+              <p:nvPicPr>
+                <p:cNvPr id="16" name="Picture 15"/>
+                <p:cNvPicPr>
+                  <a:picLocks noChangeAspect="1"/>
+                </p:cNvPicPr>
+                <p:nvPr/>
+              </p:nvPicPr>
+              <p:blipFill>
+                <a:blip r:embed="rId7">
+                  <a:extLst>
+                    <a:ext uri="{28A0092B-C50C-407E-A947-70E740481C1C}">
+                      <a14:useLocalDpi xmlns:a14="http://schemas.microsoft.com/office/drawing/2010/main" val="0"/>
+                    </a:ext>
+                  </a:extLst>
+                </a:blip>
+                <a:stretch>
+                  <a:fillRect/>
+                </a:stretch>
+              </p:blipFill>
+              <p:spPr>
+                <a:xfrm>
+                  <a:off x="17393771" y="22782207"/>
+                  <a:ext cx="5715000" cy="6667500"/>
+                </a:xfrm>
+                <a:prstGeom prst="rect">
+                  <a:avLst/>
+                </a:prstGeom>
+              </p:spPr>
+            </p:pic>
+          </p:grpSp>
+          <p:sp>
+            <p:nvSpPr>
+              <p:cNvPr id="23" name="TextBox 22"/>
+              <p:cNvSpPr txBox="1"/>
+              <p:nvPr/>
+            </p:nvSpPr>
+            <p:spPr>
+              <a:xfrm>
+                <a:off x="12095629" y="22215164"/>
+                <a:ext cx="12270441" cy="1049646"/>
+              </a:xfrm>
+              <a:prstGeom prst="rect">
+                <a:avLst/>
+              </a:prstGeom>
+              <a:noFill/>
+            </p:spPr>
+            <p:txBody>
+              <a:bodyPr wrap="square" rtlCol="0">
+                <a:spAutoFit/>
+              </a:bodyPr>
+              <a:lstStyle/>
+              <a:p>
+                <a:pPr algn="ctr"/>
+                <a:r>
+                  <a:rPr lang="en-US" dirty="0">
+                    <a:latin typeface="Agency FB" panose="020B0503020202020204" pitchFamily="34" charset="0"/>
+                  </a:rPr>
+                  <a:t>Height vs. Career Yardage </a:t>
+                </a:r>
+              </a:p>
+            </p:txBody>
+          </p:sp>
+        </p:grpSp>
+        <p:grpSp>
+          <p:nvGrpSpPr>
+            <p:cNvPr id="26" name="Group 25"/>
+            <p:cNvGrpSpPr/>
+            <p:nvPr/>
+          </p:nvGrpSpPr>
+          <p:grpSpPr>
+            <a:xfrm>
+              <a:off x="12095628" y="12788885"/>
+              <a:ext cx="12270443" cy="8682795"/>
+              <a:chOff x="12095628" y="12788885"/>
+              <a:chExt cx="12270443" cy="8682795"/>
+            </a:xfrm>
+          </p:grpSpPr>
+          <p:grpSp>
+            <p:nvGrpSpPr>
+              <p:cNvPr id="13" name="Group 12"/>
+              <p:cNvGrpSpPr/>
+              <p:nvPr/>
+            </p:nvGrpSpPr>
+            <p:grpSpPr>
+              <a:xfrm>
+                <a:off x="12095630" y="13946608"/>
+                <a:ext cx="12270441" cy="4771838"/>
+                <a:chOff x="5963771" y="14215546"/>
+                <a:chExt cx="17145000" cy="6667500"/>
+              </a:xfrm>
+            </p:grpSpPr>
+            <p:pic>
+              <p:nvPicPr>
+                <p:cNvPr id="10" name="Picture 9"/>
+                <p:cNvPicPr>
+                  <a:picLocks noChangeAspect="1"/>
+                </p:cNvPicPr>
+                <p:nvPr/>
+              </p:nvPicPr>
+              <p:blipFill>
+                <a:blip r:embed="rId8">
+                  <a:extLst>
+                    <a:ext uri="{28A0092B-C50C-407E-A947-70E740481C1C}">
+                      <a14:useLocalDpi xmlns:a14="http://schemas.microsoft.com/office/drawing/2010/main" val="0"/>
+                    </a:ext>
+                  </a:extLst>
+                </a:blip>
+                <a:stretch>
+                  <a:fillRect/>
+                </a:stretch>
+              </p:blipFill>
+              <p:spPr>
+                <a:xfrm>
+                  <a:off x="5963771" y="14215546"/>
+                  <a:ext cx="5715000" cy="6667500"/>
+                </a:xfrm>
+                <a:prstGeom prst="rect">
+                  <a:avLst/>
+                </a:prstGeom>
+              </p:spPr>
+            </p:pic>
+            <p:pic>
+              <p:nvPicPr>
+                <p:cNvPr id="11" name="Picture 10"/>
+                <p:cNvPicPr>
+                  <a:picLocks noChangeAspect="1"/>
+                </p:cNvPicPr>
+                <p:nvPr/>
+              </p:nvPicPr>
+              <p:blipFill>
+                <a:blip r:embed="rId9">
+                  <a:extLst>
+                    <a:ext uri="{28A0092B-C50C-407E-A947-70E740481C1C}">
+                      <a14:useLocalDpi xmlns:a14="http://schemas.microsoft.com/office/drawing/2010/main" val="0"/>
+                    </a:ext>
+                  </a:extLst>
+                </a:blip>
+                <a:stretch>
+                  <a:fillRect/>
+                </a:stretch>
+              </p:blipFill>
+              <p:spPr>
+                <a:xfrm>
+                  <a:off x="11678771" y="14215546"/>
+                  <a:ext cx="5715000" cy="6667500"/>
+                </a:xfrm>
+                <a:prstGeom prst="rect">
+                  <a:avLst/>
+                </a:prstGeom>
+              </p:spPr>
+            </p:pic>
+            <p:pic>
+              <p:nvPicPr>
+                <p:cNvPr id="12" name="Picture 11"/>
+                <p:cNvPicPr>
+                  <a:picLocks noChangeAspect="1"/>
+                </p:cNvPicPr>
+                <p:nvPr/>
+              </p:nvPicPr>
+              <p:blipFill>
+                <a:blip r:embed="rId10">
+                  <a:extLst>
+                    <a:ext uri="{28A0092B-C50C-407E-A947-70E740481C1C}">
+                      <a14:useLocalDpi xmlns:a14="http://schemas.microsoft.com/office/drawing/2010/main" val="0"/>
+                    </a:ext>
+                  </a:extLst>
+                </a:blip>
+                <a:stretch>
+                  <a:fillRect/>
+                </a:stretch>
+              </p:blipFill>
+              <p:spPr>
+                <a:xfrm>
+                  <a:off x="17393771" y="14215546"/>
+                  <a:ext cx="5715000" cy="6667500"/>
+                </a:xfrm>
+                <a:prstGeom prst="rect">
+                  <a:avLst/>
+                </a:prstGeom>
+              </p:spPr>
+            </p:pic>
+          </p:grpSp>
+          <p:sp>
+            <p:nvSpPr>
+              <p:cNvPr id="22" name="TextBox 21"/>
+              <p:cNvSpPr txBox="1"/>
+              <p:nvPr/>
+            </p:nvSpPr>
+            <p:spPr>
+              <a:xfrm>
+                <a:off x="12095629" y="12788885"/>
+                <a:ext cx="12270442" cy="1049646"/>
+              </a:xfrm>
+              <a:prstGeom prst="rect">
+                <a:avLst/>
+              </a:prstGeom>
+              <a:noFill/>
+            </p:spPr>
+            <p:txBody>
+              <a:bodyPr wrap="square" rtlCol="0">
+                <a:spAutoFit/>
+              </a:bodyPr>
+              <a:lstStyle/>
+              <a:p>
+                <a:pPr algn="ctr"/>
+                <a:r>
+                  <a:rPr lang="en-US" dirty="0">
+                    <a:latin typeface="Agency FB" panose="020B0503020202020204" pitchFamily="34" charset="0"/>
+                  </a:rPr>
+                  <a:t>Speed Score vs. Career Yardage </a:t>
+                </a:r>
+              </a:p>
+            </p:txBody>
+          </p:sp>
+          <p:pic>
+            <p:nvPicPr>
+              <p:cNvPr id="24" name="Picture 23"/>
+              <p:cNvPicPr>
+                <a:picLocks noChangeAspect="1"/>
+              </p:cNvPicPr>
+              <p:nvPr/>
+            </p:nvPicPr>
+            <p:blipFill>
+              <a:blip r:embed="rId11"/>
+              <a:stretch>
+                <a:fillRect/>
+              </a:stretch>
+            </p:blipFill>
+            <p:spPr>
+              <a:xfrm>
+                <a:off x="16952539" y="20223905"/>
+                <a:ext cx="2886075" cy="1247775"/>
+              </a:xfrm>
+              <a:prstGeom prst="rect">
+                <a:avLst/>
+              </a:prstGeom>
+            </p:spPr>
+          </p:pic>
+          <p:sp>
+            <p:nvSpPr>
+              <p:cNvPr id="25" name="TextBox 24"/>
+              <p:cNvSpPr txBox="1"/>
+              <p:nvPr/>
+            </p:nvSpPr>
+            <p:spPr>
+              <a:xfrm>
+                <a:off x="12095628" y="18933243"/>
+                <a:ext cx="12270442" cy="1200329"/>
+              </a:xfrm>
+              <a:prstGeom prst="rect">
+                <a:avLst/>
+              </a:prstGeom>
+              <a:noFill/>
+            </p:spPr>
+            <p:txBody>
+              <a:bodyPr wrap="square" rtlCol="0">
+                <a:spAutoFit/>
+              </a:bodyPr>
+              <a:lstStyle/>
+              <a:p>
+                <a:r>
+                  <a:rPr lang="en-US" sz="3600" dirty="0"/>
+                  <a:t>S</a:t>
+                </a:r>
+                <a:r>
+                  <a:rPr lang="en-US" sz="3600" dirty="0" smtClean="0"/>
+                  <a:t>peed score is a metric used to measure speed that adjusts for players' weight and is calculated using the following formula:</a:t>
+                </a:r>
+                <a:endParaRPr lang="en-US" sz="3600" dirty="0"/>
+              </a:p>
+            </p:txBody>
+          </p:sp>
+        </p:grpSp>
+      </p:grpSp>
     </p:spTree>
     <p:extLst>
       <p:ext uri="{BB962C8B-B14F-4D97-AF65-F5344CB8AC3E}">

</xml_diff>